<commit_message>
Update presentation and add JS
</commit_message>
<xml_diff>
--- a/html-css-javascript/MSA-Presentation-template.pptx
+++ b/html-css-javascript/MSA-Presentation-template.pptx
@@ -5,14 +5,16 @@
     <p:sldMasterId id="2147483648" r:id="rId1"/>
   </p:sldMasterIdLst>
   <p:notesMasterIdLst>
-    <p:notesMasterId r:id="rId7"/>
+    <p:notesMasterId r:id="rId9"/>
   </p:notesMasterIdLst>
   <p:sldIdLst>
     <p:sldId id="278" r:id="rId2"/>
     <p:sldId id="288" r:id="rId3"/>
     <p:sldId id="318" r:id="rId4"/>
     <p:sldId id="317" r:id="rId5"/>
-    <p:sldId id="304" r:id="rId6"/>
+    <p:sldId id="319" r:id="rId6"/>
+    <p:sldId id="320" r:id="rId7"/>
+    <p:sldId id="304" r:id="rId8"/>
   </p:sldIdLst>
   <p:sldSz cx="12192000" cy="6858000"/>
   <p:notesSz cx="6858000" cy="9144000"/>
@@ -201,7 +203,7 @@
           <a:p>
             <a:fld id="{53D551F1-3E25-2744-9BE7-0A04F579F8FB}" type="datetimeFigureOut">
               <a:rPr lang="en-US" smtClean="0"/>
-              <a:t>4/6/2021</a:t>
+              <a:t>4/13/2021</a:t>
             </a:fld>
             <a:endParaRPr lang="en-US"/>
           </a:p>
@@ -730,6 +732,180 @@
 </p:notes>
 </file>
 
+<file path=ppt/notesSlides/notesSlide4.xml><?xml version="1.0" encoding="utf-8"?>
+<p:notes xmlns:a="http://schemas.openxmlformats.org/drawingml/2006/main" xmlns:r="http://schemas.openxmlformats.org/officeDocument/2006/relationships" xmlns:p="http://schemas.openxmlformats.org/presentationml/2006/main">
+  <p:cSld>
+    <p:spTree>
+      <p:nvGrpSpPr>
+        <p:cNvPr id="1" name=""/>
+        <p:cNvGrpSpPr/>
+        <p:nvPr/>
+      </p:nvGrpSpPr>
+      <p:grpSpPr>
+        <a:xfrm>
+          <a:off x="0" y="0"/>
+          <a:ext cx="0" cy="0"/>
+          <a:chOff x="0" y="0"/>
+          <a:chExt cx="0" cy="0"/>
+        </a:xfrm>
+      </p:grpSpPr>
+      <p:sp>
+        <p:nvSpPr>
+          <p:cNvPr id="2" name="Slide Image Placeholder 1"/>
+          <p:cNvSpPr>
+            <a:spLocks noGrp="1" noRot="1" noChangeAspect="1"/>
+          </p:cNvSpPr>
+          <p:nvPr>
+            <p:ph type="sldImg"/>
+          </p:nvPr>
+        </p:nvSpPr>
+        <p:spPr/>
+      </p:sp>
+      <p:sp>
+        <p:nvSpPr>
+          <p:cNvPr id="3" name="Notes Placeholder 2"/>
+          <p:cNvSpPr>
+            <a:spLocks noGrp="1"/>
+          </p:cNvSpPr>
+          <p:nvPr>
+            <p:ph type="body" idx="1"/>
+          </p:nvPr>
+        </p:nvSpPr>
+        <p:spPr/>
+        <p:txBody>
+          <a:bodyPr/>
+          <a:lstStyle/>
+          <a:p>
+            <a:r>
+              <a:rPr lang="en-US" dirty="0"/>
+              <a:t>Explain the backend code here</a:t>
+            </a:r>
+          </a:p>
+        </p:txBody>
+      </p:sp>
+      <p:sp>
+        <p:nvSpPr>
+          <p:cNvPr id="4" name="Slide Number Placeholder 3"/>
+          <p:cNvSpPr>
+            <a:spLocks noGrp="1"/>
+          </p:cNvSpPr>
+          <p:nvPr>
+            <p:ph type="sldNum" sz="quarter" idx="10"/>
+          </p:nvPr>
+        </p:nvSpPr>
+        <p:spPr/>
+        <p:txBody>
+          <a:bodyPr/>
+          <a:lstStyle/>
+          <a:p>
+            <a:fld id="{A008DDF4-253B-4E36-BE28-46B8E6426B7B}" type="slidenum">
+              <a:rPr lang="en-US" smtClean="0"/>
+              <a:t>5</a:t>
+            </a:fld>
+            <a:endParaRPr lang="en-US"/>
+          </a:p>
+        </p:txBody>
+      </p:sp>
+    </p:spTree>
+    <p:extLst>
+      <p:ext uri="{BB962C8B-B14F-4D97-AF65-F5344CB8AC3E}">
+        <p14:creationId xmlns:p14="http://schemas.microsoft.com/office/powerpoint/2010/main" val="539259600"/>
+      </p:ext>
+    </p:extLst>
+  </p:cSld>
+  <p:clrMapOvr>
+    <a:masterClrMapping/>
+  </p:clrMapOvr>
+</p:notes>
+</file>
+
+<file path=ppt/notesSlides/notesSlide5.xml><?xml version="1.0" encoding="utf-8"?>
+<p:notes xmlns:a="http://schemas.openxmlformats.org/drawingml/2006/main" xmlns:r="http://schemas.openxmlformats.org/officeDocument/2006/relationships" xmlns:p="http://schemas.openxmlformats.org/presentationml/2006/main">
+  <p:cSld>
+    <p:spTree>
+      <p:nvGrpSpPr>
+        <p:cNvPr id="1" name=""/>
+        <p:cNvGrpSpPr/>
+        <p:nvPr/>
+      </p:nvGrpSpPr>
+      <p:grpSpPr>
+        <a:xfrm>
+          <a:off x="0" y="0"/>
+          <a:ext cx="0" cy="0"/>
+          <a:chOff x="0" y="0"/>
+          <a:chExt cx="0" cy="0"/>
+        </a:xfrm>
+      </p:grpSpPr>
+      <p:sp>
+        <p:nvSpPr>
+          <p:cNvPr id="2" name="Slide Image Placeholder 1"/>
+          <p:cNvSpPr>
+            <a:spLocks noGrp="1" noRot="1" noChangeAspect="1"/>
+          </p:cNvSpPr>
+          <p:nvPr>
+            <p:ph type="sldImg"/>
+          </p:nvPr>
+        </p:nvSpPr>
+        <p:spPr/>
+      </p:sp>
+      <p:sp>
+        <p:nvSpPr>
+          <p:cNvPr id="3" name="Notes Placeholder 2"/>
+          <p:cNvSpPr>
+            <a:spLocks noGrp="1"/>
+          </p:cNvSpPr>
+          <p:nvPr>
+            <p:ph type="body" idx="1"/>
+          </p:nvPr>
+        </p:nvSpPr>
+        <p:spPr/>
+        <p:txBody>
+          <a:bodyPr/>
+          <a:lstStyle/>
+          <a:p>
+            <a:r>
+              <a:rPr lang="en-US" dirty="0"/>
+              <a:t>Explain the backend code here</a:t>
+            </a:r>
+          </a:p>
+        </p:txBody>
+      </p:sp>
+      <p:sp>
+        <p:nvSpPr>
+          <p:cNvPr id="4" name="Slide Number Placeholder 3"/>
+          <p:cNvSpPr>
+            <a:spLocks noGrp="1"/>
+          </p:cNvSpPr>
+          <p:nvPr>
+            <p:ph type="sldNum" sz="quarter" idx="10"/>
+          </p:nvPr>
+        </p:nvSpPr>
+        <p:spPr/>
+        <p:txBody>
+          <a:bodyPr/>
+          <a:lstStyle/>
+          <a:p>
+            <a:fld id="{A008DDF4-253B-4E36-BE28-46B8E6426B7B}" type="slidenum">
+              <a:rPr lang="en-US" smtClean="0"/>
+              <a:t>6</a:t>
+            </a:fld>
+            <a:endParaRPr lang="en-US"/>
+          </a:p>
+        </p:txBody>
+      </p:sp>
+    </p:spTree>
+    <p:extLst>
+      <p:ext uri="{BB962C8B-B14F-4D97-AF65-F5344CB8AC3E}">
+        <p14:creationId xmlns:p14="http://schemas.microsoft.com/office/powerpoint/2010/main" val="1052459542"/>
+      </p:ext>
+    </p:extLst>
+  </p:cSld>
+  <p:clrMapOvr>
+    <a:masterClrMapping/>
+  </p:clrMapOvr>
+</p:notes>
+</file>
+
 <file path=ppt/slideLayouts/slideLayout1.xml><?xml version="1.0" encoding="utf-8"?>
 <p:sldLayout xmlns:a="http://schemas.openxmlformats.org/drawingml/2006/main" xmlns:r="http://schemas.openxmlformats.org/officeDocument/2006/relationships" xmlns:p="http://schemas.openxmlformats.org/presentationml/2006/main" type="title" preserve="1">
   <p:cSld name="Title Slide">
@@ -861,7 +1037,7 @@
           <a:p>
             <a:fld id="{F4356D17-FE2B-4A42-AE6B-E0B8894B79EA}" type="datetimeFigureOut">
               <a:rPr lang="en-US" smtClean="0"/>
-              <a:t>4/6/2021</a:t>
+              <a:t>4/13/2021</a:t>
             </a:fld>
             <a:endParaRPr lang="en-US"/>
           </a:p>
@@ -1031,7 +1207,7 @@
           <a:p>
             <a:fld id="{F4356D17-FE2B-4A42-AE6B-E0B8894B79EA}" type="datetimeFigureOut">
               <a:rPr lang="en-US" smtClean="0"/>
-              <a:t>4/6/2021</a:t>
+              <a:t>4/13/2021</a:t>
             </a:fld>
             <a:endParaRPr lang="en-US"/>
           </a:p>
@@ -1211,7 +1387,7 @@
           <a:p>
             <a:fld id="{F4356D17-FE2B-4A42-AE6B-E0B8894B79EA}" type="datetimeFigureOut">
               <a:rPr lang="en-US" smtClean="0"/>
-              <a:t>4/6/2021</a:t>
+              <a:t>4/13/2021</a:t>
             </a:fld>
             <a:endParaRPr lang="en-US"/>
           </a:p>
@@ -1563,7 +1739,7 @@
           <a:p>
             <a:fld id="{F4356D17-FE2B-4A42-AE6B-E0B8894B79EA}" type="datetimeFigureOut">
               <a:rPr lang="en-US" smtClean="0"/>
-              <a:t>4/6/2021</a:t>
+              <a:t>4/13/2021</a:t>
             </a:fld>
             <a:endParaRPr lang="en-US"/>
           </a:p>
@@ -1809,7 +1985,7 @@
           <a:p>
             <a:fld id="{F4356D17-FE2B-4A42-AE6B-E0B8894B79EA}" type="datetimeFigureOut">
               <a:rPr lang="en-US" smtClean="0"/>
-              <a:t>4/6/2021</a:t>
+              <a:t>4/13/2021</a:t>
             </a:fld>
             <a:endParaRPr lang="en-US"/>
           </a:p>
@@ -2041,7 +2217,7 @@
           <a:p>
             <a:fld id="{F4356D17-FE2B-4A42-AE6B-E0B8894B79EA}" type="datetimeFigureOut">
               <a:rPr lang="en-US" smtClean="0"/>
-              <a:t>4/6/2021</a:t>
+              <a:t>4/13/2021</a:t>
             </a:fld>
             <a:endParaRPr lang="en-US"/>
           </a:p>
@@ -2408,7 +2584,7 @@
           <a:p>
             <a:fld id="{F4356D17-FE2B-4A42-AE6B-E0B8894B79EA}" type="datetimeFigureOut">
               <a:rPr lang="en-US" smtClean="0"/>
-              <a:t>4/6/2021</a:t>
+              <a:t>4/13/2021</a:t>
             </a:fld>
             <a:endParaRPr lang="en-US"/>
           </a:p>
@@ -2526,7 +2702,7 @@
           <a:p>
             <a:fld id="{F4356D17-FE2B-4A42-AE6B-E0B8894B79EA}" type="datetimeFigureOut">
               <a:rPr lang="en-US" smtClean="0"/>
-              <a:t>4/6/2021</a:t>
+              <a:t>4/13/2021</a:t>
             </a:fld>
             <a:endParaRPr lang="en-US"/>
           </a:p>
@@ -2621,7 +2797,7 @@
           <a:p>
             <a:fld id="{F4356D17-FE2B-4A42-AE6B-E0B8894B79EA}" type="datetimeFigureOut">
               <a:rPr lang="en-US" smtClean="0"/>
-              <a:t>4/6/2021</a:t>
+              <a:t>4/13/2021</a:t>
             </a:fld>
             <a:endParaRPr lang="en-US"/>
           </a:p>
@@ -2898,7 +3074,7 @@
           <a:p>
             <a:fld id="{F4356D17-FE2B-4A42-AE6B-E0B8894B79EA}" type="datetimeFigureOut">
               <a:rPr lang="en-US" smtClean="0"/>
-              <a:t>4/6/2021</a:t>
+              <a:t>4/13/2021</a:t>
             </a:fld>
             <a:endParaRPr lang="en-US"/>
           </a:p>
@@ -3151,7 +3327,7 @@
           <a:p>
             <a:fld id="{F4356D17-FE2B-4A42-AE6B-E0B8894B79EA}" type="datetimeFigureOut">
               <a:rPr lang="en-US" smtClean="0"/>
-              <a:t>4/6/2021</a:t>
+              <a:t>4/13/2021</a:t>
             </a:fld>
             <a:endParaRPr lang="en-US"/>
           </a:p>
@@ -3364,7 +3540,7 @@
           <a:p>
             <a:fld id="{F4356D17-FE2B-4A42-AE6B-E0B8894B79EA}" type="datetimeFigureOut">
               <a:rPr lang="en-US" smtClean="0"/>
-              <a:t>4/6/2021</a:t>
+              <a:t>4/13/2021</a:t>
             </a:fld>
             <a:endParaRPr lang="en-US"/>
           </a:p>
@@ -3886,8 +4062,8 @@
         </p:nvSpPr>
         <p:spPr>
           <a:xfrm>
-            <a:off x="5962933" y="1979027"/>
-            <a:ext cx="5926137" cy="2671510"/>
+            <a:off x="5974808" y="1979027"/>
+            <a:ext cx="6229067" cy="2671510"/>
           </a:xfrm>
         </p:spPr>
         <p:txBody>
@@ -3897,17 +4073,18 @@
           <a:lstStyle/>
           <a:p>
             <a:r>
-              <a:rPr lang="en-NZ" sz="3600" dirty="0"/>
-              <a:t>&lt;Topic Name&gt;</a:t>
-            </a:r>
-          </a:p>
-          <a:p>
+              <a:rPr lang="en-US" sz="3600" dirty="0"/>
+              <a:t>Intro to HTML CSS &amp; JavaScript</a:t>
+            </a:r>
             <a:endParaRPr lang="en-NZ" sz="2400" dirty="0"/>
           </a:p>
           <a:p>
+            <a:endParaRPr lang="en-NZ" sz="2400" dirty="0"/>
+          </a:p>
+          <a:p>
             <a:r>
               <a:rPr lang="en-NZ" sz="2400" dirty="0"/>
-              <a:t>&lt;Presenter Name&gt;</a:t>
+              <a:t>Jason, Raymond, CZ</a:t>
             </a:r>
           </a:p>
         </p:txBody>
@@ -3994,7 +4171,73 @@
           <a:p>
             <a:r>
               <a:rPr lang="en-NZ" dirty="0"/>
-              <a:t>&lt;Learning outcomes you’ll cover&gt;</a:t>
+              <a:t>Intro to HTML</a:t>
+            </a:r>
+          </a:p>
+          <a:p>
+            <a:pPr lvl="1"/>
+            <a:r>
+              <a:rPr lang="en-NZ" dirty="0"/>
+              <a:t>Basic HTML</a:t>
+            </a:r>
+          </a:p>
+          <a:p>
+            <a:pPr lvl="1"/>
+            <a:r>
+              <a:rPr lang="en-NZ" dirty="0" err="1"/>
+              <a:t>DevTools</a:t>
+            </a:r>
+            <a:r>
+              <a:rPr lang="en-NZ" dirty="0"/>
+              <a:t> – Inspect</a:t>
+            </a:r>
+          </a:p>
+          <a:p>
+            <a:r>
+              <a:rPr lang="en-NZ" dirty="0"/>
+              <a:t>Cascading Style Sheets</a:t>
+            </a:r>
+          </a:p>
+          <a:p>
+            <a:pPr lvl="1"/>
+            <a:r>
+              <a:rPr lang="en-NZ" dirty="0" err="1"/>
+              <a:t>Classnames</a:t>
+            </a:r>
+            <a:r>
+              <a:rPr lang="en-NZ" dirty="0"/>
+              <a:t> &amp; IDs</a:t>
+            </a:r>
+          </a:p>
+          <a:p>
+            <a:pPr lvl="1"/>
+            <a:r>
+              <a:rPr lang="en-NZ" dirty="0"/>
+              <a:t>Basic CSS styling</a:t>
+            </a:r>
+          </a:p>
+          <a:p>
+            <a:r>
+              <a:rPr lang="en-NZ" dirty="0"/>
+              <a:t>Basic JavaScript</a:t>
+            </a:r>
+          </a:p>
+          <a:p>
+            <a:pPr lvl="1"/>
+            <a:r>
+              <a:rPr lang="en-NZ" dirty="0" err="1"/>
+              <a:t>DevTools</a:t>
+            </a:r>
+            <a:r>
+              <a:rPr lang="en-NZ" dirty="0"/>
+              <a:t> – Console</a:t>
+            </a:r>
+          </a:p>
+          <a:p>
+            <a:pPr lvl="1"/>
+            <a:r>
+              <a:rPr lang="en-NZ" dirty="0"/>
+              <a:t>Interacting with HTML &amp; CSS</a:t>
             </a:r>
           </a:p>
         </p:txBody>
@@ -4081,7 +4324,41 @@
           <a:p>
             <a:r>
               <a:rPr lang="en-NZ" dirty="0"/>
-              <a:t>&lt;Bullet points of prerequisites needed i.e. software, accounts&gt;</a:t>
+              <a:t>A Browser</a:t>
+            </a:r>
+          </a:p>
+          <a:p>
+            <a:pPr lvl="1"/>
+            <a:r>
+              <a:rPr lang="en-NZ" dirty="0"/>
+              <a:t>Recommending Chrome, Firefox, or Microsoft Edge</a:t>
+            </a:r>
+          </a:p>
+          <a:p>
+            <a:pPr lvl="1"/>
+            <a:endParaRPr lang="en-NZ" dirty="0"/>
+          </a:p>
+          <a:p>
+            <a:r>
+              <a:rPr lang="en-NZ" dirty="0"/>
+              <a:t>Text Editor</a:t>
+            </a:r>
+          </a:p>
+          <a:p>
+            <a:pPr lvl="1"/>
+            <a:r>
+              <a:rPr lang="en-NZ" dirty="0"/>
+              <a:t>Recommending Visual Studio Code </a:t>
+            </a:r>
+            <a:r>
+              <a:rPr lang="en-NZ" dirty="0">
+                <a:hlinkClick r:id="rId4"/>
+              </a:rPr>
+              <a:t>https://code.visualstudio.com/</a:t>
+            </a:r>
+            <a:r>
+              <a:rPr lang="en-NZ" dirty="0"/>
+              <a:t> </a:t>
             </a:r>
           </a:p>
         </p:txBody>
@@ -4134,10 +4411,13 @@
           <a:bodyPr/>
           <a:lstStyle/>
           <a:p>
-            <a:endParaRPr lang="en-US" dirty="0">
-              <a:latin typeface="Segoe UI Light" panose="020B0502040204020203" pitchFamily="34" charset="0"/>
-              <a:cs typeface="Segoe UI Light" panose="020B0502040204020203" pitchFamily="34" charset="0"/>
-            </a:endParaRPr>
+            <a:r>
+              <a:rPr lang="en-US" dirty="0">
+                <a:latin typeface="Segoe UI Light" panose="020B0502040204020203" pitchFamily="34" charset="0"/>
+                <a:cs typeface="Segoe UI Light" panose="020B0502040204020203" pitchFamily="34" charset="0"/>
+              </a:rPr>
+              <a:t>Intro to HTML</a:t>
+            </a:r>
           </a:p>
         </p:txBody>
       </p:sp>
@@ -4169,6 +4449,10 @@
           </a:bodyPr>
           <a:lstStyle/>
           <a:p>
+            <a:r>
+              <a:rPr lang="en-US" sz="3600" dirty="0"/>
+              <a:t>HTML (Hyper Text Markup Language)</a:t>
+            </a:r>
             <a:endParaRPr lang="en-NZ" sz="3600" dirty="0"/>
           </a:p>
         </p:txBody>
@@ -4190,6 +4474,199 @@
 </file>
 
 <file path=ppt/slides/slide5.xml><?xml version="1.0" encoding="utf-8"?>
+<p:sld xmlns:a="http://schemas.openxmlformats.org/drawingml/2006/main" xmlns:r="http://schemas.openxmlformats.org/officeDocument/2006/relationships" xmlns:p="http://schemas.openxmlformats.org/presentationml/2006/main">
+  <p:cSld>
+    <p:spTree>
+      <p:nvGrpSpPr>
+        <p:cNvPr id="1" name=""/>
+        <p:cNvGrpSpPr/>
+        <p:nvPr/>
+      </p:nvGrpSpPr>
+      <p:grpSpPr>
+        <a:xfrm>
+          <a:off x="0" y="0"/>
+          <a:ext cx="0" cy="0"/>
+          <a:chOff x="0" y="0"/>
+          <a:chExt cx="0" cy="0"/>
+        </a:xfrm>
+      </p:grpSpPr>
+      <p:sp>
+        <p:nvSpPr>
+          <p:cNvPr id="2" name="Title 1"/>
+          <p:cNvSpPr>
+            <a:spLocks noGrp="1"/>
+          </p:cNvSpPr>
+          <p:nvPr>
+            <p:ph type="title"/>
+          </p:nvPr>
+        </p:nvSpPr>
+        <p:spPr/>
+        <p:txBody>
+          <a:bodyPr/>
+          <a:lstStyle/>
+          <a:p>
+            <a:r>
+              <a:rPr lang="en-US" dirty="0">
+                <a:latin typeface="Segoe UI Light" panose="020B0502040204020203" pitchFamily="34" charset="0"/>
+                <a:cs typeface="Segoe UI Light" panose="020B0502040204020203" pitchFamily="34" charset="0"/>
+              </a:rPr>
+              <a:t>CSS</a:t>
+            </a:r>
+          </a:p>
+        </p:txBody>
+      </p:sp>
+      <p:sp>
+        <p:nvSpPr>
+          <p:cNvPr id="5" name="Content Placeholder 2">
+            <a:extLst>
+              <a:ext uri="{FF2B5EF4-FFF2-40B4-BE49-F238E27FC236}">
+                <a16:creationId xmlns:a16="http://schemas.microsoft.com/office/drawing/2014/main" id="{5E04B231-F20B-4D24-B5FF-A05D73501FD5}"/>
+              </a:ext>
+            </a:extLst>
+          </p:cNvPr>
+          <p:cNvSpPr>
+            <a:spLocks noGrp="1"/>
+          </p:cNvSpPr>
+          <p:nvPr>
+            <p:ph idx="1"/>
+          </p:nvPr>
+        </p:nvSpPr>
+        <p:spPr>
+          <a:xfrm>
+            <a:off x="838200" y="1558636"/>
+            <a:ext cx="10515600" cy="4260273"/>
+          </a:xfrm>
+        </p:spPr>
+        <p:txBody>
+          <a:bodyPr>
+            <a:normAutofit/>
+          </a:bodyPr>
+          <a:lstStyle/>
+          <a:p>
+            <a:r>
+              <a:rPr lang="en-US" sz="3600" dirty="0"/>
+              <a:t>CSS (Cascading Style Sheets)</a:t>
+            </a:r>
+            <a:endParaRPr lang="en-NZ" sz="3600" dirty="0"/>
+          </a:p>
+        </p:txBody>
+      </p:sp>
+    </p:spTree>
+    <p:custDataLst>
+      <p:tags r:id="rId1"/>
+    </p:custDataLst>
+    <p:extLst>
+      <p:ext uri="{BB962C8B-B14F-4D97-AF65-F5344CB8AC3E}">
+        <p14:creationId xmlns:p14="http://schemas.microsoft.com/office/powerpoint/2010/main" val="610906413"/>
+      </p:ext>
+    </p:extLst>
+  </p:cSld>
+  <p:clrMapOvr>
+    <a:masterClrMapping/>
+  </p:clrMapOvr>
+</p:sld>
+</file>
+
+<file path=ppt/slides/slide6.xml><?xml version="1.0" encoding="utf-8"?>
+<p:sld xmlns:a="http://schemas.openxmlformats.org/drawingml/2006/main" xmlns:r="http://schemas.openxmlformats.org/officeDocument/2006/relationships" xmlns:p="http://schemas.openxmlformats.org/presentationml/2006/main">
+  <p:cSld>
+    <p:spTree>
+      <p:nvGrpSpPr>
+        <p:cNvPr id="1" name=""/>
+        <p:cNvGrpSpPr/>
+        <p:nvPr/>
+      </p:nvGrpSpPr>
+      <p:grpSpPr>
+        <a:xfrm>
+          <a:off x="0" y="0"/>
+          <a:ext cx="0" cy="0"/>
+          <a:chOff x="0" y="0"/>
+          <a:chExt cx="0" cy="0"/>
+        </a:xfrm>
+      </p:grpSpPr>
+      <p:sp>
+        <p:nvSpPr>
+          <p:cNvPr id="2" name="Title 1"/>
+          <p:cNvSpPr>
+            <a:spLocks noGrp="1"/>
+          </p:cNvSpPr>
+          <p:nvPr>
+            <p:ph type="title"/>
+          </p:nvPr>
+        </p:nvSpPr>
+        <p:spPr/>
+        <p:txBody>
+          <a:bodyPr/>
+          <a:lstStyle/>
+          <a:p>
+            <a:r>
+              <a:rPr lang="en-US" dirty="0">
+                <a:latin typeface="Segoe UI Light" panose="020B0502040204020203" pitchFamily="34" charset="0"/>
+                <a:cs typeface="Segoe UI Light" panose="020B0502040204020203" pitchFamily="34" charset="0"/>
+              </a:rPr>
+              <a:t>JavaScript</a:t>
+            </a:r>
+          </a:p>
+        </p:txBody>
+      </p:sp>
+      <p:sp>
+        <p:nvSpPr>
+          <p:cNvPr id="5" name="Content Placeholder 2">
+            <a:extLst>
+              <a:ext uri="{FF2B5EF4-FFF2-40B4-BE49-F238E27FC236}">
+                <a16:creationId xmlns:a16="http://schemas.microsoft.com/office/drawing/2014/main" id="{5E04B231-F20B-4D24-B5FF-A05D73501FD5}"/>
+              </a:ext>
+            </a:extLst>
+          </p:cNvPr>
+          <p:cNvSpPr>
+            <a:spLocks noGrp="1"/>
+          </p:cNvSpPr>
+          <p:nvPr>
+            <p:ph idx="1"/>
+          </p:nvPr>
+        </p:nvSpPr>
+        <p:spPr>
+          <a:xfrm>
+            <a:off x="838200" y="1558636"/>
+            <a:ext cx="10515600" cy="4260273"/>
+          </a:xfrm>
+        </p:spPr>
+        <p:txBody>
+          <a:bodyPr>
+            <a:normAutofit/>
+          </a:bodyPr>
+          <a:lstStyle/>
+          <a:p>
+            <a:r>
+              <a:rPr lang="en-US" sz="3600" dirty="0"/>
+              <a:t>JS (JavaScript) – lightweight, interpreted language</a:t>
+            </a:r>
+          </a:p>
+          <a:p>
+            <a:r>
+              <a:rPr lang="en-NZ" sz="3600" dirty="0"/>
+              <a:t>JS makes webpages interactive</a:t>
+            </a:r>
+          </a:p>
+        </p:txBody>
+      </p:sp>
+    </p:spTree>
+    <p:custDataLst>
+      <p:tags r:id="rId1"/>
+    </p:custDataLst>
+    <p:extLst>
+      <p:ext uri="{BB962C8B-B14F-4D97-AF65-F5344CB8AC3E}">
+        <p14:creationId xmlns:p14="http://schemas.microsoft.com/office/powerpoint/2010/main" val="1119689456"/>
+      </p:ext>
+    </p:extLst>
+  </p:cSld>
+  <p:clrMapOvr>
+    <a:masterClrMapping/>
+  </p:clrMapOvr>
+</p:sld>
+</file>
+
+<file path=ppt/slides/slide7.xml><?xml version="1.0" encoding="utf-8"?>
 <p:sld xmlns:a="http://schemas.openxmlformats.org/drawingml/2006/main" xmlns:r="http://schemas.openxmlformats.org/officeDocument/2006/relationships" xmlns:p="http://schemas.openxmlformats.org/presentationml/2006/main">
   <p:cSld>
     <p:spTree>
@@ -4319,6 +4796,20 @@
 </file>
 
 <file path=ppt/tags/tag5.xml><?xml version="1.0" encoding="utf-8"?>
+<p:tagLst xmlns:a="http://schemas.openxmlformats.org/drawingml/2006/main" xmlns:r="http://schemas.openxmlformats.org/officeDocument/2006/relationships" xmlns:p="http://schemas.openxmlformats.org/presentationml/2006/main">
+  <p:tag name="POINTS" val="1"/>
+  <p:tag name="TIME" val="15"/>
+</p:tagLst>
+</file>
+
+<file path=ppt/tags/tag6.xml><?xml version="1.0" encoding="utf-8"?>
+<p:tagLst xmlns:a="http://schemas.openxmlformats.org/drawingml/2006/main" xmlns:r="http://schemas.openxmlformats.org/officeDocument/2006/relationships" xmlns:p="http://schemas.openxmlformats.org/presentationml/2006/main">
+  <p:tag name="POINTS" val="1"/>
+  <p:tag name="TIME" val="15"/>
+</p:tagLst>
+</file>
+
+<file path=ppt/tags/tag7.xml><?xml version="1.0" encoding="utf-8"?>
 <p:tagLst xmlns:a="http://schemas.openxmlformats.org/drawingml/2006/main" xmlns:r="http://schemas.openxmlformats.org/officeDocument/2006/relationships" xmlns:p="http://schemas.openxmlformats.org/presentationml/2006/main">
   <p:tag name="POINTS" val="1"/>
   <p:tag name="TIME" val="15"/>

</xml_diff>